<commit_message>
Tabelas em excel adicionadas
</commit_message>
<xml_diff>
--- a/Seminario/Data Warehouse.pptx
+++ b/Seminario/Data Warehouse.pptx
@@ -1,9 +1,12 @@
 
 <file path=ppt/presentation.xml><?xml version="1.0" encoding="utf-8"?>
-<p:presentation xmlns:a="http://schemas.openxmlformats.org/drawingml/2006/main" xmlns:r="http://schemas.openxmlformats.org/officeDocument/2006/relationships" xmlns:p="http://schemas.openxmlformats.org/presentationml/2006/main" saveSubsetFonts="1">
+<p:presentation xmlns:a="http://schemas.openxmlformats.org/drawingml/2006/main" xmlns:r="http://schemas.openxmlformats.org/officeDocument/2006/relationships" xmlns:p="http://schemas.openxmlformats.org/presentationml/2006/main" showSpecialPlsOnTitleSld="0" saveSubsetFonts="1">
   <p:sldMasterIdLst>
     <p:sldMasterId id="2147483729" r:id="rId1"/>
   </p:sldMasterIdLst>
+  <p:notesMasterIdLst>
+    <p:notesMasterId r:id="rId16"/>
+  </p:notesMasterIdLst>
   <p:sldIdLst>
     <p:sldId id="256" r:id="rId2"/>
     <p:sldId id="257" r:id="rId3"/>
@@ -18,6 +21,7 @@
     <p:sldId id="266" r:id="rId12"/>
     <p:sldId id="264" r:id="rId13"/>
     <p:sldId id="268" r:id="rId14"/>
+    <p:sldId id="269" r:id="rId15"/>
   </p:sldIdLst>
   <p:sldSz cx="9144000" cy="6858000" type="screen4x3"/>
   <p:notesSz cx="6858000" cy="9144000"/>
@@ -133,6 +137,440 @@
     </p:ext>
   </p:extLst>
 </p:presentation>
+</file>
+
+<file path=ppt/notesMasters/notesMaster1.xml><?xml version="1.0" encoding="utf-8"?>
+<p:notesMaster xmlns:a="http://schemas.openxmlformats.org/drawingml/2006/main" xmlns:r="http://schemas.openxmlformats.org/officeDocument/2006/relationships" xmlns:p="http://schemas.openxmlformats.org/presentationml/2006/main">
+  <p:cSld>
+    <p:bg>
+      <p:bgRef idx="1001">
+        <a:schemeClr val="bg1"/>
+      </p:bgRef>
+    </p:bg>
+    <p:spTree>
+      <p:nvGrpSpPr>
+        <p:cNvPr id="1" name=""/>
+        <p:cNvGrpSpPr/>
+        <p:nvPr/>
+      </p:nvGrpSpPr>
+      <p:grpSpPr>
+        <a:xfrm>
+          <a:off x="0" y="0"/>
+          <a:ext cx="0" cy="0"/>
+          <a:chOff x="0" y="0"/>
+          <a:chExt cx="0" cy="0"/>
+        </a:xfrm>
+      </p:grpSpPr>
+      <p:sp>
+        <p:nvSpPr>
+          <p:cNvPr id="2" name="Espaço Reservado para Cabeçalho 1"/>
+          <p:cNvSpPr>
+            <a:spLocks noGrp="1"/>
+          </p:cNvSpPr>
+          <p:nvPr>
+            <p:ph type="hdr" sz="quarter"/>
+          </p:nvPr>
+        </p:nvSpPr>
+        <p:spPr>
+          <a:xfrm>
+            <a:off x="0" y="0"/>
+            <a:ext cx="2971800" cy="458788"/>
+          </a:xfrm>
+          <a:prstGeom prst="rect">
+            <a:avLst/>
+          </a:prstGeom>
+        </p:spPr>
+        <p:txBody>
+          <a:bodyPr vert="horz" lIns="91440" tIns="45720" rIns="91440" bIns="45720" rtlCol="0"/>
+          <a:lstStyle>
+            <a:lvl1pPr algn="l">
+              <a:defRPr sz="1200"/>
+            </a:lvl1pPr>
+          </a:lstStyle>
+          <a:p>
+            <a:endParaRPr lang="pt-BR"/>
+          </a:p>
+        </p:txBody>
+      </p:sp>
+      <p:sp>
+        <p:nvSpPr>
+          <p:cNvPr id="3" name="Espaço Reservado para Data 2"/>
+          <p:cNvSpPr>
+            <a:spLocks noGrp="1"/>
+          </p:cNvSpPr>
+          <p:nvPr>
+            <p:ph type="dt" idx="1"/>
+          </p:nvPr>
+        </p:nvSpPr>
+        <p:spPr>
+          <a:xfrm>
+            <a:off x="3884613" y="0"/>
+            <a:ext cx="2971800" cy="458788"/>
+          </a:xfrm>
+          <a:prstGeom prst="rect">
+            <a:avLst/>
+          </a:prstGeom>
+        </p:spPr>
+        <p:txBody>
+          <a:bodyPr vert="horz" lIns="91440" tIns="45720" rIns="91440" bIns="45720" rtlCol="0"/>
+          <a:lstStyle>
+            <a:lvl1pPr algn="r">
+              <a:defRPr sz="1200"/>
+            </a:lvl1pPr>
+          </a:lstStyle>
+          <a:p>
+            <a:fld id="{1CFF6A93-BEF2-4B04-B242-C60BBA43986D}" type="datetimeFigureOut">
+              <a:rPr lang="pt-BR" smtClean="0"/>
+              <a:t>06/11/2016</a:t>
+            </a:fld>
+            <a:endParaRPr lang="pt-BR"/>
+          </a:p>
+        </p:txBody>
+      </p:sp>
+      <p:sp>
+        <p:nvSpPr>
+          <p:cNvPr id="4" name="Espaço Reservado para Imagem de Slide 3"/>
+          <p:cNvSpPr>
+            <a:spLocks noGrp="1" noRot="1" noChangeAspect="1"/>
+          </p:cNvSpPr>
+          <p:nvPr>
+            <p:ph type="sldImg" idx="2"/>
+          </p:nvPr>
+        </p:nvSpPr>
+        <p:spPr>
+          <a:xfrm>
+            <a:off x="1371600" y="1143000"/>
+            <a:ext cx="4114800" cy="3086100"/>
+          </a:xfrm>
+          <a:prstGeom prst="rect">
+            <a:avLst/>
+          </a:prstGeom>
+          <a:noFill/>
+          <a:ln w="12700">
+            <a:solidFill>
+              <a:prstClr val="black"/>
+            </a:solidFill>
+          </a:ln>
+        </p:spPr>
+        <p:txBody>
+          <a:bodyPr vert="horz" lIns="91440" tIns="45720" rIns="91440" bIns="45720" rtlCol="0" anchor="ctr"/>
+          <a:lstStyle/>
+          <a:p>
+            <a:endParaRPr lang="pt-BR"/>
+          </a:p>
+        </p:txBody>
+      </p:sp>
+      <p:sp>
+        <p:nvSpPr>
+          <p:cNvPr id="5" name="Espaço Reservado para Anotações 4"/>
+          <p:cNvSpPr>
+            <a:spLocks noGrp="1"/>
+          </p:cNvSpPr>
+          <p:nvPr>
+            <p:ph type="body" sz="quarter" idx="3"/>
+          </p:nvPr>
+        </p:nvSpPr>
+        <p:spPr>
+          <a:xfrm>
+            <a:off x="685800" y="4400550"/>
+            <a:ext cx="5486400" cy="3600450"/>
+          </a:xfrm>
+          <a:prstGeom prst="rect">
+            <a:avLst/>
+          </a:prstGeom>
+        </p:spPr>
+        <p:txBody>
+          <a:bodyPr vert="horz" lIns="91440" tIns="45720" rIns="91440" bIns="45720" rtlCol="0"/>
+          <a:lstStyle/>
+          <a:p>
+            <a:pPr lvl="0"/>
+            <a:r>
+              <a:rPr lang="pt-BR" smtClean="0"/>
+              <a:t>Clique para editar o texto mestre</a:t>
+            </a:r>
+          </a:p>
+          <a:p>
+            <a:pPr lvl="1"/>
+            <a:r>
+              <a:rPr lang="pt-BR" smtClean="0"/>
+              <a:t>Segundo nível</a:t>
+            </a:r>
+          </a:p>
+          <a:p>
+            <a:pPr lvl="2"/>
+            <a:r>
+              <a:rPr lang="pt-BR" smtClean="0"/>
+              <a:t>Terceiro nível</a:t>
+            </a:r>
+          </a:p>
+          <a:p>
+            <a:pPr lvl="3"/>
+            <a:r>
+              <a:rPr lang="pt-BR" smtClean="0"/>
+              <a:t>Quarto nível</a:t>
+            </a:r>
+          </a:p>
+          <a:p>
+            <a:pPr lvl="4"/>
+            <a:r>
+              <a:rPr lang="pt-BR" smtClean="0"/>
+              <a:t>Quinto nível</a:t>
+            </a:r>
+            <a:endParaRPr lang="pt-BR"/>
+          </a:p>
+        </p:txBody>
+      </p:sp>
+      <p:sp>
+        <p:nvSpPr>
+          <p:cNvPr id="6" name="Espaço Reservado para Rodapé 5"/>
+          <p:cNvSpPr>
+            <a:spLocks noGrp="1"/>
+          </p:cNvSpPr>
+          <p:nvPr>
+            <p:ph type="ftr" sz="quarter" idx="4"/>
+          </p:nvPr>
+        </p:nvSpPr>
+        <p:spPr>
+          <a:xfrm>
+            <a:off x="0" y="8685213"/>
+            <a:ext cx="2971800" cy="458787"/>
+          </a:xfrm>
+          <a:prstGeom prst="rect">
+            <a:avLst/>
+          </a:prstGeom>
+        </p:spPr>
+        <p:txBody>
+          <a:bodyPr vert="horz" lIns="91440" tIns="45720" rIns="91440" bIns="45720" rtlCol="0" anchor="b"/>
+          <a:lstStyle>
+            <a:lvl1pPr algn="l">
+              <a:defRPr sz="1200"/>
+            </a:lvl1pPr>
+          </a:lstStyle>
+          <a:p>
+            <a:endParaRPr lang="pt-BR"/>
+          </a:p>
+        </p:txBody>
+      </p:sp>
+      <p:sp>
+        <p:nvSpPr>
+          <p:cNvPr id="7" name="Espaço Reservado para Número de Slide 6"/>
+          <p:cNvSpPr>
+            <a:spLocks noGrp="1"/>
+          </p:cNvSpPr>
+          <p:nvPr>
+            <p:ph type="sldNum" sz="quarter" idx="5"/>
+          </p:nvPr>
+        </p:nvSpPr>
+        <p:spPr>
+          <a:xfrm>
+            <a:off x="3884613" y="8685213"/>
+            <a:ext cx="2971800" cy="458787"/>
+          </a:xfrm>
+          <a:prstGeom prst="rect">
+            <a:avLst/>
+          </a:prstGeom>
+        </p:spPr>
+        <p:txBody>
+          <a:bodyPr vert="horz" lIns="91440" tIns="45720" rIns="91440" bIns="45720" rtlCol="0" anchor="b"/>
+          <a:lstStyle>
+            <a:lvl1pPr algn="r">
+              <a:defRPr sz="1200"/>
+            </a:lvl1pPr>
+          </a:lstStyle>
+          <a:p>
+            <a:fld id="{8C7E27CE-7A61-450F-9B50-775941449E52}" type="slidenum">
+              <a:rPr lang="pt-BR" smtClean="0"/>
+              <a:t>‹nº›</a:t>
+            </a:fld>
+            <a:endParaRPr lang="pt-BR"/>
+          </a:p>
+        </p:txBody>
+      </p:sp>
+    </p:spTree>
+    <p:extLst>
+      <p:ext uri="{BB962C8B-B14F-4D97-AF65-F5344CB8AC3E}">
+        <p14:creationId xmlns:p14="http://schemas.microsoft.com/office/powerpoint/2010/main" val="703555130"/>
+      </p:ext>
+    </p:extLst>
+  </p:cSld>
+  <p:clrMap bg1="lt1" tx1="dk1" bg2="lt2" tx2="dk2" accent1="accent1" accent2="accent2" accent3="accent3" accent4="accent4" accent5="accent5" accent6="accent6" hlink="hlink" folHlink="folHlink"/>
+  <p:notesStyle>
+    <a:lvl1pPr marL="0" algn="l" defTabSz="914400" rtl="0" eaLnBrk="1" latinLnBrk="0" hangingPunct="1">
+      <a:defRPr sz="1200" kern="1200">
+        <a:solidFill>
+          <a:schemeClr val="tx1"/>
+        </a:solidFill>
+        <a:latin typeface="+mn-lt"/>
+        <a:ea typeface="+mn-ea"/>
+        <a:cs typeface="+mn-cs"/>
+      </a:defRPr>
+    </a:lvl1pPr>
+    <a:lvl2pPr marL="457200" algn="l" defTabSz="914400" rtl="0" eaLnBrk="1" latinLnBrk="0" hangingPunct="1">
+      <a:defRPr sz="1200" kern="1200">
+        <a:solidFill>
+          <a:schemeClr val="tx1"/>
+        </a:solidFill>
+        <a:latin typeface="+mn-lt"/>
+        <a:ea typeface="+mn-ea"/>
+        <a:cs typeface="+mn-cs"/>
+      </a:defRPr>
+    </a:lvl2pPr>
+    <a:lvl3pPr marL="914400" algn="l" defTabSz="914400" rtl="0" eaLnBrk="1" latinLnBrk="0" hangingPunct="1">
+      <a:defRPr sz="1200" kern="1200">
+        <a:solidFill>
+          <a:schemeClr val="tx1"/>
+        </a:solidFill>
+        <a:latin typeface="+mn-lt"/>
+        <a:ea typeface="+mn-ea"/>
+        <a:cs typeface="+mn-cs"/>
+      </a:defRPr>
+    </a:lvl3pPr>
+    <a:lvl4pPr marL="1371600" algn="l" defTabSz="914400" rtl="0" eaLnBrk="1" latinLnBrk="0" hangingPunct="1">
+      <a:defRPr sz="1200" kern="1200">
+        <a:solidFill>
+          <a:schemeClr val="tx1"/>
+        </a:solidFill>
+        <a:latin typeface="+mn-lt"/>
+        <a:ea typeface="+mn-ea"/>
+        <a:cs typeface="+mn-cs"/>
+      </a:defRPr>
+    </a:lvl4pPr>
+    <a:lvl5pPr marL="1828800" algn="l" defTabSz="914400" rtl="0" eaLnBrk="1" latinLnBrk="0" hangingPunct="1">
+      <a:defRPr sz="1200" kern="1200">
+        <a:solidFill>
+          <a:schemeClr val="tx1"/>
+        </a:solidFill>
+        <a:latin typeface="+mn-lt"/>
+        <a:ea typeface="+mn-ea"/>
+        <a:cs typeface="+mn-cs"/>
+      </a:defRPr>
+    </a:lvl5pPr>
+    <a:lvl6pPr marL="2286000" algn="l" defTabSz="914400" rtl="0" eaLnBrk="1" latinLnBrk="0" hangingPunct="1">
+      <a:defRPr sz="1200" kern="1200">
+        <a:solidFill>
+          <a:schemeClr val="tx1"/>
+        </a:solidFill>
+        <a:latin typeface="+mn-lt"/>
+        <a:ea typeface="+mn-ea"/>
+        <a:cs typeface="+mn-cs"/>
+      </a:defRPr>
+    </a:lvl6pPr>
+    <a:lvl7pPr marL="2743200" algn="l" defTabSz="914400" rtl="0" eaLnBrk="1" latinLnBrk="0" hangingPunct="1">
+      <a:defRPr sz="1200" kern="1200">
+        <a:solidFill>
+          <a:schemeClr val="tx1"/>
+        </a:solidFill>
+        <a:latin typeface="+mn-lt"/>
+        <a:ea typeface="+mn-ea"/>
+        <a:cs typeface="+mn-cs"/>
+      </a:defRPr>
+    </a:lvl7pPr>
+    <a:lvl8pPr marL="3200400" algn="l" defTabSz="914400" rtl="0" eaLnBrk="1" latinLnBrk="0" hangingPunct="1">
+      <a:defRPr sz="1200" kern="1200">
+        <a:solidFill>
+          <a:schemeClr val="tx1"/>
+        </a:solidFill>
+        <a:latin typeface="+mn-lt"/>
+        <a:ea typeface="+mn-ea"/>
+        <a:cs typeface="+mn-cs"/>
+      </a:defRPr>
+    </a:lvl8pPr>
+    <a:lvl9pPr marL="3657600" algn="l" defTabSz="914400" rtl="0" eaLnBrk="1" latinLnBrk="0" hangingPunct="1">
+      <a:defRPr sz="1200" kern="1200">
+        <a:solidFill>
+          <a:schemeClr val="tx1"/>
+        </a:solidFill>
+        <a:latin typeface="+mn-lt"/>
+        <a:ea typeface="+mn-ea"/>
+        <a:cs typeface="+mn-cs"/>
+      </a:defRPr>
+    </a:lvl9pPr>
+  </p:notesStyle>
+</p:notesMaster>
+</file>
+
+<file path=ppt/notesSlides/notesSlide1.xml><?xml version="1.0" encoding="utf-8"?>
+<p:notes xmlns:a="http://schemas.openxmlformats.org/drawingml/2006/main" xmlns:r="http://schemas.openxmlformats.org/officeDocument/2006/relationships" xmlns:p="http://schemas.openxmlformats.org/presentationml/2006/main">
+  <p:cSld>
+    <p:spTree>
+      <p:nvGrpSpPr>
+        <p:cNvPr id="1" name=""/>
+        <p:cNvGrpSpPr/>
+        <p:nvPr/>
+      </p:nvGrpSpPr>
+      <p:grpSpPr>
+        <a:xfrm>
+          <a:off x="0" y="0"/>
+          <a:ext cx="0" cy="0"/>
+          <a:chOff x="0" y="0"/>
+          <a:chExt cx="0" cy="0"/>
+        </a:xfrm>
+      </p:grpSpPr>
+      <p:sp>
+        <p:nvSpPr>
+          <p:cNvPr id="2" name="Espaço Reservado para Imagem de Slide 1"/>
+          <p:cNvSpPr>
+            <a:spLocks noGrp="1" noRot="1" noChangeAspect="1"/>
+          </p:cNvSpPr>
+          <p:nvPr>
+            <p:ph type="sldImg"/>
+          </p:nvPr>
+        </p:nvSpPr>
+        <p:spPr/>
+      </p:sp>
+      <p:sp>
+        <p:nvSpPr>
+          <p:cNvPr id="3" name="Espaço Reservado para Anotações 2"/>
+          <p:cNvSpPr>
+            <a:spLocks noGrp="1"/>
+          </p:cNvSpPr>
+          <p:nvPr>
+            <p:ph type="body" idx="1"/>
+          </p:nvPr>
+        </p:nvSpPr>
+        <p:spPr/>
+        <p:txBody>
+          <a:bodyPr/>
+          <a:lstStyle/>
+          <a:p>
+            <a:endParaRPr lang="pt-BR"/>
+          </a:p>
+        </p:txBody>
+      </p:sp>
+      <p:sp>
+        <p:nvSpPr>
+          <p:cNvPr id="4" name="Espaço Reservado para Número de Slide 3"/>
+          <p:cNvSpPr>
+            <a:spLocks noGrp="1"/>
+          </p:cNvSpPr>
+          <p:nvPr>
+            <p:ph type="sldNum" sz="quarter" idx="10"/>
+          </p:nvPr>
+        </p:nvSpPr>
+        <p:spPr/>
+        <p:txBody>
+          <a:bodyPr/>
+          <a:lstStyle/>
+          <a:p>
+            <a:fld id="{8C7E27CE-7A61-450F-9B50-775941449E52}" type="slidenum">
+              <a:rPr lang="pt-BR" smtClean="0"/>
+              <a:t>1</a:t>
+            </a:fld>
+            <a:endParaRPr lang="pt-BR"/>
+          </a:p>
+        </p:txBody>
+      </p:sp>
+    </p:spTree>
+    <p:extLst>
+      <p:ext uri="{BB962C8B-B14F-4D97-AF65-F5344CB8AC3E}">
+        <p14:creationId xmlns:p14="http://schemas.microsoft.com/office/powerpoint/2010/main" val="161043391"/>
+      </p:ext>
+    </p:extLst>
+  </p:cSld>
+  <p:clrMapOvr>
+    <a:masterClrMapping/>
+  </p:clrMapOvr>
+</p:notes>
 </file>
 
 <file path=ppt/slideLayouts/slideLayout1.xml><?xml version="1.0" encoding="utf-8"?>
@@ -927,7 +1365,7 @@
           <a:bodyPr/>
           <a:lstStyle/>
           <a:p>
-            <a:fld id="{DD6D7E86-C0CA-4A32-BAE8-E33F7F06E2CD}" type="datetimeFigureOut">
+            <a:fld id="{6AD42495-D7CE-43ED-8D27-1FC55DA60707}" type="datetime1">
               <a:rPr lang="pt-BR" smtClean="0"/>
               <a:t>06/11/2016</a:t>
             </a:fld>
@@ -1178,7 +1616,7 @@
           <a:bodyPr/>
           <a:lstStyle/>
           <a:p>
-            <a:fld id="{DD6D7E86-C0CA-4A32-BAE8-E33F7F06E2CD}" type="datetimeFigureOut">
+            <a:fld id="{8BB35A77-6113-4B96-85FA-077306696521}" type="datetime1">
               <a:rPr lang="pt-BR" smtClean="0"/>
               <a:t>06/11/2016</a:t>
             </a:fld>
@@ -1492,7 +1930,7 @@
           <a:bodyPr/>
           <a:lstStyle/>
           <a:p>
-            <a:fld id="{DD6D7E86-C0CA-4A32-BAE8-E33F7F06E2CD}" type="datetimeFigureOut">
+            <a:fld id="{769608C5-C474-4BAB-8D52-D84EA9AF8892}" type="datetime1">
               <a:rPr lang="pt-BR" smtClean="0"/>
               <a:t>06/11/2016</a:t>
             </a:fld>
@@ -1825,7 +2263,7 @@
           <a:bodyPr/>
           <a:lstStyle/>
           <a:p>
-            <a:fld id="{DD6D7E86-C0CA-4A32-BAE8-E33F7F06E2CD}" type="datetimeFigureOut">
+            <a:fld id="{B8BCF06B-4065-4B3C-8BA1-2CCC9EE4FD84}" type="datetime1">
               <a:rPr lang="pt-BR" smtClean="0"/>
               <a:t>06/11/2016</a:t>
             </a:fld>
@@ -2139,7 +2577,7 @@
           <a:bodyPr/>
           <a:lstStyle/>
           <a:p>
-            <a:fld id="{DD6D7E86-C0CA-4A32-BAE8-E33F7F06E2CD}" type="datetimeFigureOut">
+            <a:fld id="{6C8F8694-29D7-4DF4-B822-536D08977BBE}" type="datetime1">
               <a:rPr lang="pt-BR" smtClean="0"/>
               <a:t>06/11/2016</a:t>
             </a:fld>
@@ -2532,7 +2970,7 @@
           <a:bodyPr/>
           <a:lstStyle/>
           <a:p>
-            <a:fld id="{DD6D7E86-C0CA-4A32-BAE8-E33F7F06E2CD}" type="datetimeFigureOut">
+            <a:fld id="{A8679141-42A3-45FE-A148-25C269D39283}" type="datetime1">
               <a:rPr lang="pt-BR" smtClean="0"/>
               <a:t>06/11/2016</a:t>
             </a:fld>
@@ -2702,7 +3140,7 @@
           <a:bodyPr/>
           <a:lstStyle/>
           <a:p>
-            <a:fld id="{DD6D7E86-C0CA-4A32-BAE8-E33F7F06E2CD}" type="datetimeFigureOut">
+            <a:fld id="{85F6BE8D-5389-4C07-A2B6-8BAE64306542}" type="datetime1">
               <a:rPr lang="pt-BR" smtClean="0"/>
               <a:t>06/11/2016</a:t>
             </a:fld>
@@ -2882,7 +3320,7 @@
           <a:bodyPr/>
           <a:lstStyle/>
           <a:p>
-            <a:fld id="{DD6D7E86-C0CA-4A32-BAE8-E33F7F06E2CD}" type="datetimeFigureOut">
+            <a:fld id="{117076DB-F5DE-498D-A9A5-72D55935BFE8}" type="datetime1">
               <a:rPr lang="pt-BR" smtClean="0"/>
               <a:t>06/11/2016</a:t>
             </a:fld>
@@ -3052,7 +3490,7 @@
           <a:bodyPr/>
           <a:lstStyle/>
           <a:p>
-            <a:fld id="{DD6D7E86-C0CA-4A32-BAE8-E33F7F06E2CD}" type="datetimeFigureOut">
+            <a:fld id="{9727310F-5D81-4833-A241-7687BBD64C9E}" type="datetime1">
               <a:rPr lang="pt-BR" smtClean="0"/>
               <a:t>06/11/2016</a:t>
             </a:fld>
@@ -3299,7 +3737,7 @@
           <a:bodyPr/>
           <a:lstStyle/>
           <a:p>
-            <a:fld id="{DD6D7E86-C0CA-4A32-BAE8-E33F7F06E2CD}" type="datetimeFigureOut">
+            <a:fld id="{18B3D887-510C-49C6-B032-389B747EB80B}" type="datetime1">
               <a:rPr lang="pt-BR" smtClean="0"/>
               <a:t>06/11/2016</a:t>
             </a:fld>
@@ -3596,7 +4034,7 @@
           <a:bodyPr/>
           <a:lstStyle/>
           <a:p>
-            <a:fld id="{DD6D7E86-C0CA-4A32-BAE8-E33F7F06E2CD}" type="datetimeFigureOut">
+            <a:fld id="{B9E4FD3E-949D-4438-9EF9-59E93DB68CE7}" type="datetime1">
               <a:rPr lang="pt-BR" smtClean="0"/>
               <a:t>06/11/2016</a:t>
             </a:fld>
@@ -3975,7 +4413,7 @@
           <a:bodyPr/>
           <a:lstStyle/>
           <a:p>
-            <a:fld id="{DD6D7E86-C0CA-4A32-BAE8-E33F7F06E2CD}" type="datetimeFigureOut">
+            <a:fld id="{A1D2D4C0-79A9-4952-8999-E3ED0B57B683}" type="datetime1">
               <a:rPr lang="pt-BR" smtClean="0"/>
               <a:t>06/11/2016</a:t>
             </a:fld>
@@ -4098,7 +4536,7 @@
           <a:bodyPr/>
           <a:lstStyle/>
           <a:p>
-            <a:fld id="{DD6D7E86-C0CA-4A32-BAE8-E33F7F06E2CD}" type="datetimeFigureOut">
+            <a:fld id="{27F78238-81CF-4254-93DA-96F450C44A64}" type="datetime1">
               <a:rPr lang="pt-BR" smtClean="0"/>
               <a:t>06/11/2016</a:t>
             </a:fld>
@@ -4193,7 +4631,7 @@
           <a:bodyPr/>
           <a:lstStyle/>
           <a:p>
-            <a:fld id="{DD6D7E86-C0CA-4A32-BAE8-E33F7F06E2CD}" type="datetimeFigureOut">
+            <a:fld id="{12B668F0-77D1-4D70-8856-947D54D2CFE8}" type="datetime1">
               <a:rPr lang="pt-BR" smtClean="0"/>
               <a:t>06/11/2016</a:t>
             </a:fld>
@@ -4448,7 +4886,7 @@
           <a:bodyPr/>
           <a:lstStyle/>
           <a:p>
-            <a:fld id="{DD6D7E86-C0CA-4A32-BAE8-E33F7F06E2CD}" type="datetimeFigureOut">
+            <a:fld id="{C68CE336-AFAC-4907-8B49-9A1D13A361CA}" type="datetime1">
               <a:rPr lang="pt-BR" smtClean="0"/>
               <a:t>06/11/2016</a:t>
             </a:fld>
@@ -4711,7 +5149,7 @@
           <a:bodyPr/>
           <a:lstStyle/>
           <a:p>
-            <a:fld id="{DD6D7E86-C0CA-4A32-BAE8-E33F7F06E2CD}" type="datetimeFigureOut">
+            <a:fld id="{11265938-6926-4CB6-B4AF-28DF85DA3A8B}" type="datetime1">
               <a:rPr lang="pt-BR" smtClean="0"/>
               <a:t>06/11/2016</a:t>
             </a:fld>
@@ -5525,7 +5963,7 @@
             </a:lvl1pPr>
           </a:lstStyle>
           <a:p>
-            <a:fld id="{DD6D7E86-C0CA-4A32-BAE8-E33F7F06E2CD}" type="datetimeFigureOut">
+            <a:fld id="{CC2B8F18-8E7F-4B64-A3CD-B25E18D280F8}" type="datetime1">
               <a:rPr lang="pt-BR" smtClean="0"/>
               <a:t>06/11/2016</a:t>
             </a:fld>
@@ -5635,6 +6073,7 @@
     <p:sldLayoutId id="2147483744" r:id="rId15"/>
     <p:sldLayoutId id="2147483745" r:id="rId16"/>
   </p:sldLayoutIdLst>
+  <p:hf hdr="0" ftr="0" dt="0"/>
   <p:txStyles>
     <p:titleStyle>
       <a:lvl1pPr algn="l" defTabSz="457200" rtl="0" eaLnBrk="1" latinLnBrk="0" hangingPunct="1">
@@ -6235,15 +6674,11 @@
             <a:endParaRPr lang="pt-BR" sz="2000" dirty="0" smtClean="0"/>
           </a:p>
           <a:p>
-            <a:pPr lvl="0" algn="r"/>
-            <a:endParaRPr lang="pt-BR" sz="2000" dirty="0"/>
-          </a:p>
-          <a:p>
             <a:pPr marL="0" lvl="0" indent="0" algn="r">
               <a:buNone/>
             </a:pPr>
             <a:r>
-              <a:rPr lang="pt-BR" sz="900" dirty="0" err="1"/>
+              <a:rPr lang="pt-BR" sz="900" dirty="0" err="1" smtClean="0"/>
               <a:t>Fonte:http</a:t>
             </a:r>
             <a:r>
@@ -6303,14 +6738,37 @@
         </p:blipFill>
         <p:spPr>
           <a:xfrm>
-            <a:off x="1507901" y="3451539"/>
-            <a:ext cx="4734498" cy="2509284"/>
+            <a:off x="1966497" y="3319830"/>
+            <a:ext cx="4500964" cy="2385511"/>
           </a:xfrm>
           <a:prstGeom prst="rect">
             <a:avLst/>
           </a:prstGeom>
         </p:spPr>
       </p:pic>
+      <p:sp>
+        <p:nvSpPr>
+          <p:cNvPr id="4" name="Espaço Reservado para Número de Slide 3"/>
+          <p:cNvSpPr>
+            <a:spLocks noGrp="1"/>
+          </p:cNvSpPr>
+          <p:nvPr>
+            <p:ph type="sldNum" sz="quarter" idx="12"/>
+          </p:nvPr>
+        </p:nvSpPr>
+        <p:spPr/>
+        <p:txBody>
+          <a:bodyPr/>
+          <a:lstStyle/>
+          <a:p>
+            <a:fld id="{A8DB9C0C-86B5-42D5-9D57-743CB3B8D987}" type="slidenum">
+              <a:rPr lang="pt-BR" smtClean="0"/>
+              <a:t>10</a:t>
+            </a:fld>
+            <a:endParaRPr lang="pt-BR"/>
+          </a:p>
+        </p:txBody>
+      </p:sp>
     </p:spTree>
     <p:extLst>
       <p:ext uri="{BB962C8B-B14F-4D97-AF65-F5344CB8AC3E}">
@@ -6456,12 +6914,6 @@
             <a:pPr marL="0" lvl="0" indent="0" algn="r">
               <a:buNone/>
             </a:pPr>
-            <a:endParaRPr lang="pt-BR" sz="900" dirty="0"/>
-          </a:p>
-          <a:p>
-            <a:pPr marL="0" lvl="0" indent="0" algn="r">
-              <a:buNone/>
-            </a:pPr>
             <a:r>
               <a:rPr lang="pt-BR" sz="900" dirty="0" err="1" smtClean="0"/>
               <a:t>Fonte:http</a:t>
@@ -6531,6 +6983,29 @@
           </a:prstGeom>
         </p:spPr>
       </p:pic>
+      <p:sp>
+        <p:nvSpPr>
+          <p:cNvPr id="5" name="Espaço Reservado para Número de Slide 4"/>
+          <p:cNvSpPr>
+            <a:spLocks noGrp="1"/>
+          </p:cNvSpPr>
+          <p:nvPr>
+            <p:ph type="sldNum" sz="quarter" idx="12"/>
+          </p:nvPr>
+        </p:nvSpPr>
+        <p:spPr/>
+        <p:txBody>
+          <a:bodyPr/>
+          <a:lstStyle/>
+          <a:p>
+            <a:fld id="{A8DB9C0C-86B5-42D5-9D57-743CB3B8D987}" type="slidenum">
+              <a:rPr lang="pt-BR" smtClean="0"/>
+              <a:t>11</a:t>
+            </a:fld>
+            <a:endParaRPr lang="pt-BR"/>
+          </a:p>
+        </p:txBody>
+      </p:sp>
     </p:spTree>
     <p:extLst>
       <p:ext uri="{BB962C8B-B14F-4D97-AF65-F5344CB8AC3E}">
@@ -6768,6 +7243,29 @@
           </a:p>
         </p:txBody>
       </p:sp>
+      <p:sp>
+        <p:nvSpPr>
+          <p:cNvPr id="4" name="Espaço Reservado para Número de Slide 3"/>
+          <p:cNvSpPr>
+            <a:spLocks noGrp="1"/>
+          </p:cNvSpPr>
+          <p:nvPr>
+            <p:ph type="sldNum" sz="quarter" idx="12"/>
+          </p:nvPr>
+        </p:nvSpPr>
+        <p:spPr/>
+        <p:txBody>
+          <a:bodyPr/>
+          <a:lstStyle/>
+          <a:p>
+            <a:fld id="{A8DB9C0C-86B5-42D5-9D57-743CB3B8D987}" type="slidenum">
+              <a:rPr lang="pt-BR" smtClean="0"/>
+              <a:t>12</a:t>
+            </a:fld>
+            <a:endParaRPr lang="pt-BR"/>
+          </a:p>
+        </p:txBody>
+      </p:sp>
     </p:spTree>
     <p:extLst>
       <p:ext uri="{BB962C8B-B14F-4D97-AF65-F5344CB8AC3E}">
@@ -6885,6 +7383,29 @@
           </a:p>
         </p:txBody>
       </p:sp>
+      <p:sp>
+        <p:nvSpPr>
+          <p:cNvPr id="4" name="Espaço Reservado para Número de Slide 3"/>
+          <p:cNvSpPr>
+            <a:spLocks noGrp="1"/>
+          </p:cNvSpPr>
+          <p:nvPr>
+            <p:ph type="sldNum" sz="quarter" idx="12"/>
+          </p:nvPr>
+        </p:nvSpPr>
+        <p:spPr/>
+        <p:txBody>
+          <a:bodyPr/>
+          <a:lstStyle/>
+          <a:p>
+            <a:fld id="{A8DB9C0C-86B5-42D5-9D57-743CB3B8D987}" type="slidenum">
+              <a:rPr lang="pt-BR" smtClean="0"/>
+              <a:t>13</a:t>
+            </a:fld>
+            <a:endParaRPr lang="pt-BR"/>
+          </a:p>
+        </p:txBody>
+      </p:sp>
     </p:spTree>
     <p:extLst>
       <p:ext uri="{BB962C8B-B14F-4D97-AF65-F5344CB8AC3E}">
@@ -6902,6 +7423,123 @@
       </p:par>
     </p:tnLst>
   </p:timing>
+</p:sld>
+</file>
+
+<file path=ppt/slides/slide14.xml><?xml version="1.0" encoding="utf-8"?>
+<p:sld xmlns:a="http://schemas.openxmlformats.org/drawingml/2006/main" xmlns:r="http://schemas.openxmlformats.org/officeDocument/2006/relationships" xmlns:p="http://schemas.openxmlformats.org/presentationml/2006/main">
+  <p:cSld>
+    <p:spTree>
+      <p:nvGrpSpPr>
+        <p:cNvPr id="1" name=""/>
+        <p:cNvGrpSpPr/>
+        <p:nvPr/>
+      </p:nvGrpSpPr>
+      <p:grpSpPr>
+        <a:xfrm>
+          <a:off x="0" y="0"/>
+          <a:ext cx="0" cy="0"/>
+          <a:chOff x="0" y="0"/>
+          <a:chExt cx="0" cy="0"/>
+        </a:xfrm>
+      </p:grpSpPr>
+      <p:sp>
+        <p:nvSpPr>
+          <p:cNvPr id="2" name="Título 1"/>
+          <p:cNvSpPr>
+            <a:spLocks noGrp="1"/>
+          </p:cNvSpPr>
+          <p:nvPr>
+            <p:ph type="title"/>
+          </p:nvPr>
+        </p:nvSpPr>
+        <p:spPr/>
+        <p:txBody>
+          <a:bodyPr/>
+          <a:lstStyle/>
+          <a:p>
+            <a:r>
+              <a:rPr lang="pt-BR" dirty="0" smtClean="0"/>
+              <a:t>Identificação</a:t>
+            </a:r>
+            <a:endParaRPr lang="pt-BR" dirty="0"/>
+          </a:p>
+        </p:txBody>
+      </p:sp>
+      <p:sp>
+        <p:nvSpPr>
+          <p:cNvPr id="3" name="Espaço Reservado para Conteúdo 2"/>
+          <p:cNvSpPr>
+            <a:spLocks noGrp="1"/>
+          </p:cNvSpPr>
+          <p:nvPr>
+            <p:ph idx="1"/>
+          </p:nvPr>
+        </p:nvSpPr>
+        <p:spPr/>
+        <p:txBody>
+          <a:bodyPr>
+            <a:normAutofit/>
+          </a:bodyPr>
+          <a:lstStyle/>
+          <a:p>
+            <a:r>
+              <a:rPr lang="pt-BR" sz="2400" dirty="0" smtClean="0"/>
+              <a:t>Diego Leite – 14/0136371</a:t>
+            </a:r>
+          </a:p>
+          <a:p>
+            <a:r>
+              <a:rPr lang="pt-BR" sz="2400" dirty="0" err="1" smtClean="0"/>
+              <a:t>Helio</a:t>
+            </a:r>
+            <a:r>
+              <a:rPr lang="pt-BR" sz="2400" dirty="0" smtClean="0"/>
+              <a:t> Santana – 14/0142959</a:t>
+            </a:r>
+          </a:p>
+          <a:p>
+            <a:r>
+              <a:rPr lang="pt-BR" sz="2400" dirty="0" smtClean="0"/>
+              <a:t>Rodrigo Guimarães – 14/0170740</a:t>
+            </a:r>
+            <a:endParaRPr lang="pt-BR" sz="2400" dirty="0"/>
+          </a:p>
+        </p:txBody>
+      </p:sp>
+      <p:sp>
+        <p:nvSpPr>
+          <p:cNvPr id="4" name="Espaço Reservado para Número de Slide 3"/>
+          <p:cNvSpPr>
+            <a:spLocks noGrp="1"/>
+          </p:cNvSpPr>
+          <p:nvPr>
+            <p:ph type="sldNum" sz="quarter" idx="12"/>
+          </p:nvPr>
+        </p:nvSpPr>
+        <p:spPr/>
+        <p:txBody>
+          <a:bodyPr/>
+          <a:lstStyle/>
+          <a:p>
+            <a:fld id="{A8DB9C0C-86B5-42D5-9D57-743CB3B8D987}" type="slidenum">
+              <a:rPr lang="pt-BR" smtClean="0"/>
+              <a:t>14</a:t>
+            </a:fld>
+            <a:endParaRPr lang="pt-BR"/>
+          </a:p>
+        </p:txBody>
+      </p:sp>
+    </p:spTree>
+    <p:extLst>
+      <p:ext uri="{BB962C8B-B14F-4D97-AF65-F5344CB8AC3E}">
+        <p14:creationId xmlns:p14="http://schemas.microsoft.com/office/powerpoint/2010/main" val="1193779355"/>
+      </p:ext>
+    </p:extLst>
+  </p:cSld>
+  <p:clrMapOvr>
+    <a:masterClrMapping/>
+  </p:clrMapOvr>
 </p:sld>
 </file>
 
@@ -7029,6 +7667,29 @@
           </a:prstGeom>
         </p:spPr>
       </p:pic>
+      <p:sp>
+        <p:nvSpPr>
+          <p:cNvPr id="5" name="Espaço Reservado para Número de Slide 4"/>
+          <p:cNvSpPr>
+            <a:spLocks noGrp="1"/>
+          </p:cNvSpPr>
+          <p:nvPr>
+            <p:ph type="sldNum" sz="quarter" idx="12"/>
+          </p:nvPr>
+        </p:nvSpPr>
+        <p:spPr/>
+        <p:txBody>
+          <a:bodyPr/>
+          <a:lstStyle/>
+          <a:p>
+            <a:fld id="{A8DB9C0C-86B5-42D5-9D57-743CB3B8D987}" type="slidenum">
+              <a:rPr lang="pt-BR" smtClean="0"/>
+              <a:t>2</a:t>
+            </a:fld>
+            <a:endParaRPr lang="pt-BR"/>
+          </a:p>
+        </p:txBody>
+      </p:sp>
     </p:spTree>
     <p:extLst>
       <p:ext uri="{BB962C8B-B14F-4D97-AF65-F5344CB8AC3E}">
@@ -7181,6 +7842,29 @@
           </a:p>
         </p:txBody>
       </p:sp>
+      <p:sp>
+        <p:nvSpPr>
+          <p:cNvPr id="4" name="Espaço Reservado para Número de Slide 3"/>
+          <p:cNvSpPr>
+            <a:spLocks noGrp="1"/>
+          </p:cNvSpPr>
+          <p:nvPr>
+            <p:ph type="sldNum" sz="quarter" idx="12"/>
+          </p:nvPr>
+        </p:nvSpPr>
+        <p:spPr/>
+        <p:txBody>
+          <a:bodyPr/>
+          <a:lstStyle/>
+          <a:p>
+            <a:fld id="{A8DB9C0C-86B5-42D5-9D57-743CB3B8D987}" type="slidenum">
+              <a:rPr lang="pt-BR" smtClean="0"/>
+              <a:t>3</a:t>
+            </a:fld>
+            <a:endParaRPr lang="pt-BR"/>
+          </a:p>
+        </p:txBody>
+      </p:sp>
     </p:spTree>
     <p:extLst>
       <p:ext uri="{BB962C8B-B14F-4D97-AF65-F5344CB8AC3E}">
@@ -7311,6 +7995,29 @@
           </a:p>
         </p:txBody>
       </p:sp>
+      <p:sp>
+        <p:nvSpPr>
+          <p:cNvPr id="4" name="Espaço Reservado para Número de Slide 3"/>
+          <p:cNvSpPr>
+            <a:spLocks noGrp="1"/>
+          </p:cNvSpPr>
+          <p:nvPr>
+            <p:ph type="sldNum" sz="quarter" idx="12"/>
+          </p:nvPr>
+        </p:nvSpPr>
+        <p:spPr/>
+        <p:txBody>
+          <a:bodyPr/>
+          <a:lstStyle/>
+          <a:p>
+            <a:fld id="{A8DB9C0C-86B5-42D5-9D57-743CB3B8D987}" type="slidenum">
+              <a:rPr lang="pt-BR" smtClean="0"/>
+              <a:t>4</a:t>
+            </a:fld>
+            <a:endParaRPr lang="pt-BR"/>
+          </a:p>
+        </p:txBody>
+      </p:sp>
     </p:spTree>
     <p:extLst>
       <p:ext uri="{BB962C8B-B14F-4D97-AF65-F5344CB8AC3E}">
@@ -7461,6 +8168,29 @@
           </a:p>
         </p:txBody>
       </p:sp>
+      <p:sp>
+        <p:nvSpPr>
+          <p:cNvPr id="4" name="Espaço Reservado para Número de Slide 3"/>
+          <p:cNvSpPr>
+            <a:spLocks noGrp="1"/>
+          </p:cNvSpPr>
+          <p:nvPr>
+            <p:ph type="sldNum" sz="quarter" idx="12"/>
+          </p:nvPr>
+        </p:nvSpPr>
+        <p:spPr/>
+        <p:txBody>
+          <a:bodyPr/>
+          <a:lstStyle/>
+          <a:p>
+            <a:fld id="{A8DB9C0C-86B5-42D5-9D57-743CB3B8D987}" type="slidenum">
+              <a:rPr lang="pt-BR" smtClean="0"/>
+              <a:t>5</a:t>
+            </a:fld>
+            <a:endParaRPr lang="pt-BR"/>
+          </a:p>
+        </p:txBody>
+      </p:sp>
     </p:spTree>
     <p:extLst>
       <p:ext uri="{BB962C8B-B14F-4D97-AF65-F5344CB8AC3E}">
@@ -7625,6 +8355,29 @@
           </a:p>
         </p:txBody>
       </p:sp>
+      <p:sp>
+        <p:nvSpPr>
+          <p:cNvPr id="4" name="Espaço Reservado para Número de Slide 3"/>
+          <p:cNvSpPr>
+            <a:spLocks noGrp="1"/>
+          </p:cNvSpPr>
+          <p:nvPr>
+            <p:ph type="sldNum" sz="quarter" idx="12"/>
+          </p:nvPr>
+        </p:nvSpPr>
+        <p:spPr/>
+        <p:txBody>
+          <a:bodyPr/>
+          <a:lstStyle/>
+          <a:p>
+            <a:fld id="{A8DB9C0C-86B5-42D5-9D57-743CB3B8D987}" type="slidenum">
+              <a:rPr lang="pt-BR" smtClean="0"/>
+              <a:t>6</a:t>
+            </a:fld>
+            <a:endParaRPr lang="pt-BR"/>
+          </a:p>
+        </p:txBody>
+      </p:sp>
     </p:spTree>
     <p:extLst>
       <p:ext uri="{BB962C8B-B14F-4D97-AF65-F5344CB8AC3E}">
@@ -7768,6 +8521,29 @@
           </a:p>
         </p:txBody>
       </p:sp>
+      <p:sp>
+        <p:nvSpPr>
+          <p:cNvPr id="4" name="Espaço Reservado para Número de Slide 3"/>
+          <p:cNvSpPr>
+            <a:spLocks noGrp="1"/>
+          </p:cNvSpPr>
+          <p:nvPr>
+            <p:ph type="sldNum" sz="quarter" idx="12"/>
+          </p:nvPr>
+        </p:nvSpPr>
+        <p:spPr/>
+        <p:txBody>
+          <a:bodyPr/>
+          <a:lstStyle/>
+          <a:p>
+            <a:fld id="{A8DB9C0C-86B5-42D5-9D57-743CB3B8D987}" type="slidenum">
+              <a:rPr lang="pt-BR" smtClean="0"/>
+              <a:t>7</a:t>
+            </a:fld>
+            <a:endParaRPr lang="pt-BR"/>
+          </a:p>
+        </p:txBody>
+      </p:sp>
     </p:spTree>
     <p:extLst>
       <p:ext uri="{BB962C8B-B14F-4D97-AF65-F5344CB8AC3E}">
@@ -7901,6 +8677,29 @@
           </a:p>
         </p:txBody>
       </p:sp>
+      <p:sp>
+        <p:nvSpPr>
+          <p:cNvPr id="4" name="Espaço Reservado para Número de Slide 3"/>
+          <p:cNvSpPr>
+            <a:spLocks noGrp="1"/>
+          </p:cNvSpPr>
+          <p:nvPr>
+            <p:ph type="sldNum" sz="quarter" idx="12"/>
+          </p:nvPr>
+        </p:nvSpPr>
+        <p:spPr/>
+        <p:txBody>
+          <a:bodyPr/>
+          <a:lstStyle/>
+          <a:p>
+            <a:fld id="{A8DB9C0C-86B5-42D5-9D57-743CB3B8D987}" type="slidenum">
+              <a:rPr lang="pt-BR" smtClean="0"/>
+              <a:t>8</a:t>
+            </a:fld>
+            <a:endParaRPr lang="pt-BR"/>
+          </a:p>
+        </p:txBody>
+      </p:sp>
     </p:spTree>
     <p:extLst>
       <p:ext uri="{BB962C8B-B14F-4D97-AF65-F5344CB8AC3E}">
@@ -8022,6 +8821,29 @@
           </a:p>
           <a:p>
             <a:endParaRPr lang="pt-BR" dirty="0"/>
+          </a:p>
+        </p:txBody>
+      </p:sp>
+      <p:sp>
+        <p:nvSpPr>
+          <p:cNvPr id="4" name="Espaço Reservado para Número de Slide 3"/>
+          <p:cNvSpPr>
+            <a:spLocks noGrp="1"/>
+          </p:cNvSpPr>
+          <p:nvPr>
+            <p:ph type="sldNum" sz="quarter" idx="12"/>
+          </p:nvPr>
+        </p:nvSpPr>
+        <p:spPr/>
+        <p:txBody>
+          <a:bodyPr/>
+          <a:lstStyle/>
+          <a:p>
+            <a:fld id="{A8DB9C0C-86B5-42D5-9D57-743CB3B8D987}" type="slidenum">
+              <a:rPr lang="pt-BR" smtClean="0"/>
+              <a:t>9</a:t>
+            </a:fld>
+            <a:endParaRPr lang="pt-BR"/>
           </a:p>
         </p:txBody>
       </p:sp>
@@ -8302,6 +9124,267 @@
 </a:theme>
 </file>
 
+<file path=ppt/theme/theme2.xml><?xml version="1.0" encoding="utf-8"?>
+<a:theme xmlns:a="http://schemas.openxmlformats.org/drawingml/2006/main" name="Tema do Office">
+  <a:themeElements>
+    <a:clrScheme name="Escritório">
+      <a:dk1>
+        <a:sysClr val="windowText" lastClr="000000"/>
+      </a:dk1>
+      <a:lt1>
+        <a:sysClr val="window" lastClr="FFFFFF"/>
+      </a:lt1>
+      <a:dk2>
+        <a:srgbClr val="44546A"/>
+      </a:dk2>
+      <a:lt2>
+        <a:srgbClr val="E7E6E6"/>
+      </a:lt2>
+      <a:accent1>
+        <a:srgbClr val="5B9BD5"/>
+      </a:accent1>
+      <a:accent2>
+        <a:srgbClr val="ED7D31"/>
+      </a:accent2>
+      <a:accent3>
+        <a:srgbClr val="A5A5A5"/>
+      </a:accent3>
+      <a:accent4>
+        <a:srgbClr val="FFC000"/>
+      </a:accent4>
+      <a:accent5>
+        <a:srgbClr val="4472C4"/>
+      </a:accent5>
+      <a:accent6>
+        <a:srgbClr val="70AD47"/>
+      </a:accent6>
+      <a:hlink>
+        <a:srgbClr val="0563C1"/>
+      </a:hlink>
+      <a:folHlink>
+        <a:srgbClr val="954F72"/>
+      </a:folHlink>
+    </a:clrScheme>
+    <a:fontScheme name="Escritório">
+      <a:majorFont>
+        <a:latin typeface="Calibri Light" panose="020F0302020204030204"/>
+        <a:ea typeface=""/>
+        <a:cs typeface=""/>
+        <a:font script="Jpan" typeface="ＭＳ Ｐゴシック"/>
+        <a:font script="Hang" typeface="맑은 고딕"/>
+        <a:font script="Hans" typeface="宋体"/>
+        <a:font script="Hant" typeface="新細明體"/>
+        <a:font script="Arab" typeface="Times New Roman"/>
+        <a:font script="Hebr" typeface="Times New Roman"/>
+        <a:font script="Thai" typeface="Angsana New"/>
+        <a:font script="Ethi" typeface="Nyala"/>
+        <a:font script="Beng" typeface="Vrinda"/>
+        <a:font script="Gujr" typeface="Shruti"/>
+        <a:font script="Khmr" typeface="MoolBoran"/>
+        <a:font script="Knda" typeface="Tunga"/>
+        <a:font script="Guru" typeface="Raavi"/>
+        <a:font script="Cans" typeface="Euphemia"/>
+        <a:font script="Cher" typeface="Plantagenet Cherokee"/>
+        <a:font script="Yiii" typeface="Microsoft Yi Baiti"/>
+        <a:font script="Tibt" typeface="Microsoft Himalaya"/>
+        <a:font script="Thaa" typeface="MV Boli"/>
+        <a:font script="Deva" typeface="Mangal"/>
+        <a:font script="Telu" typeface="Gautami"/>
+        <a:font script="Taml" typeface="Latha"/>
+        <a:font script="Syrc" typeface="Estrangelo Edessa"/>
+        <a:font script="Orya" typeface="Kalinga"/>
+        <a:font script="Mlym" typeface="Kartika"/>
+        <a:font script="Laoo" typeface="DokChampa"/>
+        <a:font script="Sinh" typeface="Iskoola Pota"/>
+        <a:font script="Mong" typeface="Mongolian Baiti"/>
+        <a:font script="Viet" typeface="Times New Roman"/>
+        <a:font script="Uigh" typeface="Microsoft Uighur"/>
+        <a:font script="Geor" typeface="Sylfaen"/>
+      </a:majorFont>
+      <a:minorFont>
+        <a:latin typeface="Calibri" panose="020F0502020204030204"/>
+        <a:ea typeface=""/>
+        <a:cs typeface=""/>
+        <a:font script="Jpan" typeface="ＭＳ Ｐゴシック"/>
+        <a:font script="Hang" typeface="맑은 고딕"/>
+        <a:font script="Hans" typeface="宋体"/>
+        <a:font script="Hant" typeface="新細明體"/>
+        <a:font script="Arab" typeface="Arial"/>
+        <a:font script="Hebr" typeface="Arial"/>
+        <a:font script="Thai" typeface="Cordia New"/>
+        <a:font script="Ethi" typeface="Nyala"/>
+        <a:font script="Beng" typeface="Vrinda"/>
+        <a:font script="Gujr" typeface="Shruti"/>
+        <a:font script="Khmr" typeface="DaunPenh"/>
+        <a:font script="Knda" typeface="Tunga"/>
+        <a:font script="Guru" typeface="Raavi"/>
+        <a:font script="Cans" typeface="Euphemia"/>
+        <a:font script="Cher" typeface="Plantagenet Cherokee"/>
+        <a:font script="Yiii" typeface="Microsoft Yi Baiti"/>
+        <a:font script="Tibt" typeface="Microsoft Himalaya"/>
+        <a:font script="Thaa" typeface="MV Boli"/>
+        <a:font script="Deva" typeface="Mangal"/>
+        <a:font script="Telu" typeface="Gautami"/>
+        <a:font script="Taml" typeface="Latha"/>
+        <a:font script="Syrc" typeface="Estrangelo Edessa"/>
+        <a:font script="Orya" typeface="Kalinga"/>
+        <a:font script="Mlym" typeface="Kartika"/>
+        <a:font script="Laoo" typeface="DokChampa"/>
+        <a:font script="Sinh" typeface="Iskoola Pota"/>
+        <a:font script="Mong" typeface="Mongolian Baiti"/>
+        <a:font script="Viet" typeface="Arial"/>
+        <a:font script="Uigh" typeface="Microsoft Uighur"/>
+        <a:font script="Geor" typeface="Sylfaen"/>
+      </a:minorFont>
+    </a:fontScheme>
+    <a:fmtScheme name="Escritório">
+      <a:fillStyleLst>
+        <a:solidFill>
+          <a:schemeClr val="phClr"/>
+        </a:solidFill>
+        <a:gradFill rotWithShape="1">
+          <a:gsLst>
+            <a:gs pos="0">
+              <a:schemeClr val="phClr">
+                <a:lumMod val="110000"/>
+                <a:satMod val="105000"/>
+                <a:tint val="67000"/>
+              </a:schemeClr>
+            </a:gs>
+            <a:gs pos="50000">
+              <a:schemeClr val="phClr">
+                <a:lumMod val="105000"/>
+                <a:satMod val="103000"/>
+                <a:tint val="73000"/>
+              </a:schemeClr>
+            </a:gs>
+            <a:gs pos="100000">
+              <a:schemeClr val="phClr">
+                <a:lumMod val="105000"/>
+                <a:satMod val="109000"/>
+                <a:tint val="81000"/>
+              </a:schemeClr>
+            </a:gs>
+          </a:gsLst>
+          <a:lin ang="5400000" scaled="0"/>
+        </a:gradFill>
+        <a:gradFill rotWithShape="1">
+          <a:gsLst>
+            <a:gs pos="0">
+              <a:schemeClr val="phClr">
+                <a:satMod val="103000"/>
+                <a:lumMod val="102000"/>
+                <a:tint val="94000"/>
+              </a:schemeClr>
+            </a:gs>
+            <a:gs pos="50000">
+              <a:schemeClr val="phClr">
+                <a:satMod val="110000"/>
+                <a:lumMod val="100000"/>
+                <a:shade val="100000"/>
+              </a:schemeClr>
+            </a:gs>
+            <a:gs pos="100000">
+              <a:schemeClr val="phClr">
+                <a:lumMod val="99000"/>
+                <a:satMod val="120000"/>
+                <a:shade val="78000"/>
+              </a:schemeClr>
+            </a:gs>
+          </a:gsLst>
+          <a:lin ang="5400000" scaled="0"/>
+        </a:gradFill>
+      </a:fillStyleLst>
+      <a:lnStyleLst>
+        <a:ln w="6350" cap="flat" cmpd="sng" algn="ctr">
+          <a:solidFill>
+            <a:schemeClr val="phClr"/>
+          </a:solidFill>
+          <a:prstDash val="solid"/>
+          <a:miter lim="800000"/>
+        </a:ln>
+        <a:ln w="12700" cap="flat" cmpd="sng" algn="ctr">
+          <a:solidFill>
+            <a:schemeClr val="phClr"/>
+          </a:solidFill>
+          <a:prstDash val="solid"/>
+          <a:miter lim="800000"/>
+        </a:ln>
+        <a:ln w="19050" cap="flat" cmpd="sng" algn="ctr">
+          <a:solidFill>
+            <a:schemeClr val="phClr"/>
+          </a:solidFill>
+          <a:prstDash val="solid"/>
+          <a:miter lim="800000"/>
+        </a:ln>
+      </a:lnStyleLst>
+      <a:effectStyleLst>
+        <a:effectStyle>
+          <a:effectLst/>
+        </a:effectStyle>
+        <a:effectStyle>
+          <a:effectLst/>
+        </a:effectStyle>
+        <a:effectStyle>
+          <a:effectLst>
+            <a:outerShdw blurRad="57150" dist="19050" dir="5400000" algn="ctr" rotWithShape="0">
+              <a:srgbClr val="000000">
+                <a:alpha val="63000"/>
+              </a:srgbClr>
+            </a:outerShdw>
+          </a:effectLst>
+        </a:effectStyle>
+      </a:effectStyleLst>
+      <a:bgFillStyleLst>
+        <a:solidFill>
+          <a:schemeClr val="phClr"/>
+        </a:solidFill>
+        <a:solidFill>
+          <a:schemeClr val="phClr">
+            <a:tint val="95000"/>
+            <a:satMod val="170000"/>
+          </a:schemeClr>
+        </a:solidFill>
+        <a:gradFill rotWithShape="1">
+          <a:gsLst>
+            <a:gs pos="0">
+              <a:schemeClr val="phClr">
+                <a:tint val="93000"/>
+                <a:satMod val="150000"/>
+                <a:shade val="98000"/>
+                <a:lumMod val="102000"/>
+              </a:schemeClr>
+            </a:gs>
+            <a:gs pos="50000">
+              <a:schemeClr val="phClr">
+                <a:tint val="98000"/>
+                <a:satMod val="130000"/>
+                <a:shade val="90000"/>
+                <a:lumMod val="103000"/>
+              </a:schemeClr>
+            </a:gs>
+            <a:gs pos="100000">
+              <a:schemeClr val="phClr">
+                <a:shade val="63000"/>
+                <a:satMod val="120000"/>
+              </a:schemeClr>
+            </a:gs>
+          </a:gsLst>
+          <a:lin ang="5400000" scaled="0"/>
+        </a:gradFill>
+      </a:bgFillStyleLst>
+    </a:fmtScheme>
+  </a:themeElements>
+  <a:objectDefaults/>
+  <a:extraClrSchemeLst/>
+  <a:extLst>
+    <a:ext uri="{05A4C25C-085E-4340-85A3-A5531E510DB2}">
+      <thm15:themeFamily xmlns:thm15="http://schemas.microsoft.com/office/thememl/2012/main" name="Office Theme" id="{62F939B6-93AF-4DB8-9C6B-D6C7DFDC589F}" vid="{4A3C46E8-61CC-4603-A589-7422A47A8E4A}"/>
+    </a:ext>
+  </a:extLst>
+</a:theme>
+</file>
+
 <file path=ppt/theme/themeOverride1.xml><?xml version="1.0" encoding="utf-8"?>
 <a:themeOverride xmlns:a="http://schemas.openxmlformats.org/drawingml/2006/main">
   <a:clrScheme name="Facetado">

</xml_diff>

<commit_message>
Versão final do seminário
</commit_message>
<xml_diff>
--- a/Seminario/Data Warehouse.pptx
+++ b/Seminario/Data Warehouse.pptx
@@ -10,8 +10,8 @@
   <p:sldIdLst>
     <p:sldId id="256" r:id="rId2"/>
     <p:sldId id="257" r:id="rId3"/>
-    <p:sldId id="267" r:id="rId4"/>
-    <p:sldId id="260" r:id="rId5"/>
+    <p:sldId id="260" r:id="rId4"/>
+    <p:sldId id="267" r:id="rId5"/>
     <p:sldId id="261" r:id="rId6"/>
     <p:sldId id="258" r:id="rId7"/>
     <p:sldId id="262" r:id="rId8"/>
@@ -221,7 +221,7 @@
           <a:p>
             <a:fld id="{1CFF6A93-BEF2-4B04-B242-C60BBA43986D}" type="datetimeFigureOut">
               <a:rPr lang="pt-BR" smtClean="0"/>
-              <a:t>06/11/2016</a:t>
+              <a:t>23/11/2016</a:t>
             </a:fld>
             <a:endParaRPr lang="pt-BR"/>
           </a:p>
@@ -1367,7 +1367,7 @@
           <a:p>
             <a:fld id="{6AD42495-D7CE-43ED-8D27-1FC55DA60707}" type="datetime1">
               <a:rPr lang="pt-BR" smtClean="0"/>
-              <a:t>06/11/2016</a:t>
+              <a:t>23/11/2016</a:t>
             </a:fld>
             <a:endParaRPr lang="pt-BR"/>
           </a:p>
@@ -1618,7 +1618,7 @@
           <a:p>
             <a:fld id="{8BB35A77-6113-4B96-85FA-077306696521}" type="datetime1">
               <a:rPr lang="pt-BR" smtClean="0"/>
-              <a:t>06/11/2016</a:t>
+              <a:t>23/11/2016</a:t>
             </a:fld>
             <a:endParaRPr lang="pt-BR"/>
           </a:p>
@@ -1932,7 +1932,7 @@
           <a:p>
             <a:fld id="{769608C5-C474-4BAB-8D52-D84EA9AF8892}" type="datetime1">
               <a:rPr lang="pt-BR" smtClean="0"/>
-              <a:t>06/11/2016</a:t>
+              <a:t>23/11/2016</a:t>
             </a:fld>
             <a:endParaRPr lang="pt-BR"/>
           </a:p>
@@ -2265,7 +2265,7 @@
           <a:p>
             <a:fld id="{B8BCF06B-4065-4B3C-8BA1-2CCC9EE4FD84}" type="datetime1">
               <a:rPr lang="pt-BR" smtClean="0"/>
-              <a:t>06/11/2016</a:t>
+              <a:t>23/11/2016</a:t>
             </a:fld>
             <a:endParaRPr lang="pt-BR"/>
           </a:p>
@@ -2579,7 +2579,7 @@
           <a:p>
             <a:fld id="{6C8F8694-29D7-4DF4-B822-536D08977BBE}" type="datetime1">
               <a:rPr lang="pt-BR" smtClean="0"/>
-              <a:t>06/11/2016</a:t>
+              <a:t>23/11/2016</a:t>
             </a:fld>
             <a:endParaRPr lang="pt-BR"/>
           </a:p>
@@ -2972,7 +2972,7 @@
           <a:p>
             <a:fld id="{A8679141-42A3-45FE-A148-25C269D39283}" type="datetime1">
               <a:rPr lang="pt-BR" smtClean="0"/>
-              <a:t>06/11/2016</a:t>
+              <a:t>23/11/2016</a:t>
             </a:fld>
             <a:endParaRPr lang="pt-BR"/>
           </a:p>
@@ -3142,7 +3142,7 @@
           <a:p>
             <a:fld id="{85F6BE8D-5389-4C07-A2B6-8BAE64306542}" type="datetime1">
               <a:rPr lang="pt-BR" smtClean="0"/>
-              <a:t>06/11/2016</a:t>
+              <a:t>23/11/2016</a:t>
             </a:fld>
             <a:endParaRPr lang="pt-BR"/>
           </a:p>
@@ -3322,7 +3322,7 @@
           <a:p>
             <a:fld id="{117076DB-F5DE-498D-A9A5-72D55935BFE8}" type="datetime1">
               <a:rPr lang="pt-BR" smtClean="0"/>
-              <a:t>06/11/2016</a:t>
+              <a:t>23/11/2016</a:t>
             </a:fld>
             <a:endParaRPr lang="pt-BR"/>
           </a:p>
@@ -3492,7 +3492,7 @@
           <a:p>
             <a:fld id="{9727310F-5D81-4833-A241-7687BBD64C9E}" type="datetime1">
               <a:rPr lang="pt-BR" smtClean="0"/>
-              <a:t>06/11/2016</a:t>
+              <a:t>23/11/2016</a:t>
             </a:fld>
             <a:endParaRPr lang="pt-BR"/>
           </a:p>
@@ -3739,7 +3739,7 @@
           <a:p>
             <a:fld id="{18B3D887-510C-49C6-B032-389B747EB80B}" type="datetime1">
               <a:rPr lang="pt-BR" smtClean="0"/>
-              <a:t>06/11/2016</a:t>
+              <a:t>23/11/2016</a:t>
             </a:fld>
             <a:endParaRPr lang="pt-BR"/>
           </a:p>
@@ -4036,7 +4036,7 @@
           <a:p>
             <a:fld id="{B9E4FD3E-949D-4438-9EF9-59E93DB68CE7}" type="datetime1">
               <a:rPr lang="pt-BR" smtClean="0"/>
-              <a:t>06/11/2016</a:t>
+              <a:t>23/11/2016</a:t>
             </a:fld>
             <a:endParaRPr lang="pt-BR"/>
           </a:p>
@@ -4415,7 +4415,7 @@
           <a:p>
             <a:fld id="{A1D2D4C0-79A9-4952-8999-E3ED0B57B683}" type="datetime1">
               <a:rPr lang="pt-BR" smtClean="0"/>
-              <a:t>06/11/2016</a:t>
+              <a:t>23/11/2016</a:t>
             </a:fld>
             <a:endParaRPr lang="pt-BR"/>
           </a:p>
@@ -4538,7 +4538,7 @@
           <a:p>
             <a:fld id="{27F78238-81CF-4254-93DA-96F450C44A64}" type="datetime1">
               <a:rPr lang="pt-BR" smtClean="0"/>
-              <a:t>06/11/2016</a:t>
+              <a:t>23/11/2016</a:t>
             </a:fld>
             <a:endParaRPr lang="pt-BR"/>
           </a:p>
@@ -4633,7 +4633,7 @@
           <a:p>
             <a:fld id="{12B668F0-77D1-4D70-8856-947D54D2CFE8}" type="datetime1">
               <a:rPr lang="pt-BR" smtClean="0"/>
-              <a:t>06/11/2016</a:t>
+              <a:t>23/11/2016</a:t>
             </a:fld>
             <a:endParaRPr lang="pt-BR"/>
           </a:p>
@@ -4888,7 +4888,7 @@
           <a:p>
             <a:fld id="{C68CE336-AFAC-4907-8B49-9A1D13A361CA}" type="datetime1">
               <a:rPr lang="pt-BR" smtClean="0"/>
-              <a:t>06/11/2016</a:t>
+              <a:t>23/11/2016</a:t>
             </a:fld>
             <a:endParaRPr lang="pt-BR"/>
           </a:p>
@@ -5151,7 +5151,7 @@
           <a:p>
             <a:fld id="{11265938-6926-4CB6-B4AF-28DF85DA3A8B}" type="datetime1">
               <a:rPr lang="pt-BR" smtClean="0"/>
-              <a:t>06/11/2016</a:t>
+              <a:t>23/11/2016</a:t>
             </a:fld>
             <a:endParaRPr lang="pt-BR"/>
           </a:p>
@@ -5965,7 +5965,7 @@
           <a:p>
             <a:fld id="{CC2B8F18-8E7F-4B64-A3CD-B25E18D280F8}" type="datetime1">
               <a:rPr lang="pt-BR" smtClean="0"/>
-              <a:t>06/11/2016</a:t>
+              <a:t>23/11/2016</a:t>
             </a:fld>
             <a:endParaRPr lang="pt-BR"/>
           </a:p>
@@ -7490,12 +7490,12 @@
           </a:p>
           <a:p>
             <a:r>
-              <a:rPr lang="pt-BR" sz="2400" dirty="0" err="1" smtClean="0"/>
-              <a:t>Helio</a:t>
-            </a:r>
-            <a:r>
               <a:rPr lang="pt-BR" sz="2400" dirty="0" smtClean="0"/>
-              <a:t> Santana – 14/0142959</a:t>
+              <a:t>Hélio </a:t>
+            </a:r>
+            <a:r>
+              <a:rPr lang="pt-BR" sz="2400" dirty="0" smtClean="0"/>
+              <a:t>Santana – 14/0142959</a:t>
             </a:r>
           </a:p>
           <a:p>
@@ -7605,7 +7605,7 @@
         <p:spPr>
           <a:xfrm>
             <a:off x="609599" y="1684072"/>
-            <a:ext cx="6347714" cy="3880773"/>
+            <a:ext cx="6347714" cy="4897032"/>
           </a:xfrm>
         </p:spPr>
         <p:txBody>
@@ -7631,8 +7631,84 @@
             </a:r>
             <a:r>
               <a:rPr lang="pt-BR" baseline="30000" dirty="0" smtClean="0"/>
-              <a:t>[5]</a:t>
-            </a:r>
+              <a:t>[5</a:t>
+            </a:r>
+            <a:r>
+              <a:rPr lang="pt-BR" baseline="30000" dirty="0" smtClean="0"/>
+              <a:t>]</a:t>
+            </a:r>
+          </a:p>
+          <a:p>
+            <a:pPr marL="0" indent="0" algn="r">
+              <a:buNone/>
+            </a:pPr>
+            <a:r>
+              <a:rPr lang="pt-BR" baseline="30000" dirty="0" smtClean="0"/>
+              <a:t>PETRINI</a:t>
+            </a:r>
+          </a:p>
+          <a:p>
+            <a:pPr marL="0" indent="0" algn="r">
+              <a:buNone/>
+            </a:pPr>
+            <a:endParaRPr lang="pt-BR" baseline="30000" dirty="0"/>
+          </a:p>
+          <a:p>
+            <a:pPr marL="0" indent="0" algn="r">
+              <a:buNone/>
+            </a:pPr>
+            <a:endParaRPr lang="pt-BR" baseline="30000" dirty="0" smtClean="0"/>
+          </a:p>
+          <a:p>
+            <a:pPr marL="0" indent="0" algn="r">
+              <a:buNone/>
+            </a:pPr>
+            <a:endParaRPr lang="pt-BR" baseline="30000" dirty="0"/>
+          </a:p>
+          <a:p>
+            <a:pPr marL="0" indent="0" algn="r">
+              <a:buNone/>
+            </a:pPr>
+            <a:endParaRPr lang="pt-BR" baseline="30000" dirty="0" smtClean="0"/>
+          </a:p>
+          <a:p>
+            <a:pPr marL="0" indent="0" algn="r">
+              <a:buNone/>
+            </a:pPr>
+            <a:endParaRPr lang="pt-BR" baseline="30000" dirty="0"/>
+          </a:p>
+          <a:p>
+            <a:pPr marL="0" indent="0" algn="r">
+              <a:buNone/>
+            </a:pPr>
+            <a:endParaRPr lang="pt-BR" baseline="30000" dirty="0" smtClean="0"/>
+          </a:p>
+          <a:p>
+            <a:pPr marL="0" indent="0" algn="r">
+              <a:buNone/>
+            </a:pPr>
+            <a:endParaRPr lang="pt-BR" baseline="30000" dirty="0"/>
+          </a:p>
+          <a:p>
+            <a:pPr marL="0" indent="0" algn="r">
+              <a:buNone/>
+            </a:pPr>
+            <a:endParaRPr lang="pt-BR" baseline="30000" dirty="0" smtClean="0"/>
+          </a:p>
+          <a:p>
+            <a:pPr marL="0" indent="0" algn="r">
+              <a:buNone/>
+            </a:pPr>
+            <a:r>
+              <a:rPr lang="pt-BR" baseline="30000" dirty="0" smtClean="0"/>
+              <a:t>[4]</a:t>
+            </a:r>
+            <a:endParaRPr lang="pt-BR" baseline="30000" dirty="0"/>
+          </a:p>
+          <a:p>
+            <a:pPr marL="0" indent="0" algn="r">
+              <a:buNone/>
+            </a:pPr>
             <a:endParaRPr lang="pt-BR" dirty="0"/>
           </a:p>
         </p:txBody>
@@ -7659,7 +7735,7 @@
         </p:blipFill>
         <p:spPr>
           <a:xfrm>
-            <a:off x="979486" y="3284113"/>
+            <a:off x="1250813" y="3410182"/>
             <a:ext cx="5347151" cy="2813743"/>
           </a:xfrm>
           <a:prstGeom prst="rect">
@@ -7737,19 +7813,14 @@
             <p:ph type="title"/>
           </p:nvPr>
         </p:nvSpPr>
-        <p:spPr>
-          <a:xfrm>
-            <a:off x="609599" y="609600"/>
-            <a:ext cx="6589691" cy="1320800"/>
-          </a:xfrm>
-        </p:spPr>
+        <p:spPr/>
         <p:txBody>
           <a:bodyPr/>
           <a:lstStyle/>
           <a:p>
             <a:r>
               <a:rPr lang="pt-BR" dirty="0" smtClean="0"/>
-              <a:t>Ferramentas para manipulação de dados</a:t>
+              <a:t>O que é Data Warehouse</a:t>
             </a:r>
             <a:endParaRPr lang="pt-BR" dirty="0"/>
           </a:p>
@@ -7772,73 +7843,56 @@
           </a:bodyPr>
           <a:lstStyle/>
           <a:p>
-            <a:r>
-              <a:rPr lang="pt-BR" sz="2400" dirty="0" smtClean="0"/>
-              <a:t>OLAP (</a:t>
-            </a:r>
-            <a:r>
-              <a:rPr lang="pt-BR" sz="2400" i="1" dirty="0"/>
-              <a:t>Online </a:t>
-            </a:r>
-            <a:r>
-              <a:rPr lang="pt-BR" sz="2400" i="1" dirty="0" err="1"/>
-              <a:t>Analytical</a:t>
-            </a:r>
-            <a:r>
-              <a:rPr lang="pt-BR" sz="2400" i="1" dirty="0"/>
+            <a:pPr algn="just"/>
+            <a:r>
+              <a:rPr lang="pt-BR" sz="2000" dirty="0"/>
+              <a:t>“</a:t>
+            </a:r>
+            <a:r>
+              <a:rPr lang="pt-BR" sz="2000" i="1" dirty="0"/>
+              <a:t>Um banco de dados especializado, o qual integra e gerencia o fluxo de informações a partir dos bancos de dados corporativos e fontes de dados externas à empresa</a:t>
+            </a:r>
+            <a:r>
+              <a:rPr lang="pt-BR" sz="2000" i="1" dirty="0" smtClean="0"/>
+              <a:t>.”</a:t>
+            </a:r>
+            <a:r>
+              <a:rPr lang="pt-BR" sz="2000" i="1" baseline="30000" dirty="0" smtClean="0"/>
+              <a:t>[</a:t>
+            </a:r>
+            <a:r>
+              <a:rPr lang="pt-BR" sz="2000" baseline="30000" dirty="0" smtClean="0"/>
+              <a:t>1]</a:t>
+            </a:r>
+            <a:endParaRPr lang="pt-BR" sz="2000" baseline="30000" dirty="0"/>
+          </a:p>
+          <a:p>
+            <a:pPr marL="0" indent="0" algn="just">
+              <a:buNone/>
+            </a:pPr>
+            <a:r>
+              <a:rPr lang="pt-BR" sz="2000" dirty="0" smtClean="0"/>
               <a:t> </a:t>
             </a:r>
-            <a:r>
-              <a:rPr lang="pt-BR" sz="2400" i="1" dirty="0" err="1" smtClean="0"/>
-              <a:t>Processing</a:t>
-            </a:r>
-            <a:r>
-              <a:rPr lang="pt-BR" sz="2400" i="1" dirty="0" smtClean="0"/>
-              <a:t>)</a:t>
-            </a:r>
-            <a:endParaRPr lang="pt-BR" sz="2400" dirty="0" smtClean="0"/>
-          </a:p>
-          <a:p>
-            <a:r>
-              <a:rPr lang="pt-BR" sz="2400" dirty="0" smtClean="0"/>
-              <a:t>OLTP (</a:t>
-            </a:r>
-            <a:r>
-              <a:rPr lang="pt-BR" sz="2400" i="1" dirty="0"/>
-              <a:t>Online </a:t>
-            </a:r>
-            <a:r>
-              <a:rPr lang="pt-BR" sz="2400" i="1" dirty="0" err="1"/>
-              <a:t>Transaction</a:t>
-            </a:r>
-            <a:r>
-              <a:rPr lang="pt-BR" sz="2400" i="1" dirty="0"/>
-              <a:t> </a:t>
-            </a:r>
-            <a:r>
-              <a:rPr lang="pt-BR" sz="2400" i="1" dirty="0" err="1" smtClean="0"/>
-              <a:t>Processing</a:t>
-            </a:r>
-            <a:r>
-              <a:rPr lang="pt-BR" sz="2400" i="1" dirty="0" smtClean="0"/>
-              <a:t>)</a:t>
-            </a:r>
-            <a:endParaRPr lang="pt-BR" sz="2400" dirty="0" smtClean="0"/>
-          </a:p>
-          <a:p>
-            <a:r>
-              <a:rPr lang="pt-BR" sz="2400" dirty="0" smtClean="0"/>
-              <a:t>Data Mining (</a:t>
-            </a:r>
-            <a:r>
-              <a:rPr lang="pt-BR" sz="2400" dirty="0" err="1" smtClean="0"/>
-              <a:t>Mineiração</a:t>
-            </a:r>
-            <a:r>
-              <a:rPr lang="pt-BR" sz="2400" dirty="0" smtClean="0"/>
-              <a:t> de Dados)</a:t>
-            </a:r>
-            <a:endParaRPr lang="pt-BR" sz="2400" dirty="0"/>
+          </a:p>
+          <a:p>
+            <a:pPr algn="just"/>
+            <a:r>
+              <a:rPr lang="pt-BR" sz="2000" dirty="0" smtClean="0"/>
+              <a:t>A </a:t>
+            </a:r>
+            <a:r>
+              <a:rPr lang="pt-BR" sz="2000" dirty="0"/>
+              <a:t>principal função do </a:t>
+            </a:r>
+            <a:r>
+              <a:rPr lang="pt-BR" sz="2000" dirty="0" smtClean="0"/>
+              <a:t>Data Warehouse </a:t>
+            </a:r>
+            <a:r>
+              <a:rPr lang="pt-BR" sz="2000" dirty="0"/>
+              <a:t>é prover a informação mais adequada para o grupo que analisa as informações tomar uma decisão analítica de suporte ao negócio.</a:t>
+            </a:r>
           </a:p>
         </p:txBody>
       </p:sp>
@@ -7868,7 +7922,7 @@
     </p:spTree>
     <p:extLst>
       <p:ext uri="{BB962C8B-B14F-4D97-AF65-F5344CB8AC3E}">
-        <p14:creationId xmlns:p14="http://schemas.microsoft.com/office/powerpoint/2010/main" val="2580112143"/>
+        <p14:creationId xmlns:p14="http://schemas.microsoft.com/office/powerpoint/2010/main" val="1336026203"/>
       </p:ext>
     </p:extLst>
   </p:cSld>
@@ -7912,14 +7966,19 @@
             <p:ph type="title"/>
           </p:nvPr>
         </p:nvSpPr>
-        <p:spPr/>
+        <p:spPr>
+          <a:xfrm>
+            <a:off x="609599" y="609600"/>
+            <a:ext cx="6589691" cy="1320800"/>
+          </a:xfrm>
+        </p:spPr>
         <p:txBody>
           <a:bodyPr/>
           <a:lstStyle/>
           <a:p>
             <a:r>
               <a:rPr lang="pt-BR" dirty="0" smtClean="0"/>
-              <a:t>O que é Data Warehouse</a:t>
+              <a:t>Ferramentas para manipulação de dados</a:t>
             </a:r>
             <a:endParaRPr lang="pt-BR" dirty="0"/>
           </a:p>
@@ -7942,56 +8001,85 @@
           </a:bodyPr>
           <a:lstStyle/>
           <a:p>
-            <a:pPr algn="just"/>
-            <a:r>
-              <a:rPr lang="pt-BR" sz="2000" dirty="0"/>
-              <a:t>“</a:t>
-            </a:r>
-            <a:r>
-              <a:rPr lang="pt-BR" sz="2000" i="1" dirty="0"/>
-              <a:t>Um banco de dados especializado, o qual integra e gerencia o fluxo de informações a partir dos bancos de dados corporativos e fontes de dados externas à empresa</a:t>
-            </a:r>
-            <a:r>
-              <a:rPr lang="pt-BR" sz="2000" i="1" dirty="0" smtClean="0"/>
-              <a:t>.”</a:t>
-            </a:r>
-            <a:r>
-              <a:rPr lang="pt-BR" sz="2000" i="1" baseline="30000" dirty="0" smtClean="0"/>
-              <a:t>[</a:t>
-            </a:r>
-            <a:r>
-              <a:rPr lang="pt-BR" sz="2000" baseline="30000" dirty="0" smtClean="0"/>
-              <a:t>1]</a:t>
-            </a:r>
-            <a:endParaRPr lang="pt-BR" sz="2000" baseline="30000" dirty="0"/>
-          </a:p>
-          <a:p>
-            <a:pPr marL="0" indent="0" algn="just">
-              <a:buNone/>
-            </a:pPr>
-            <a:r>
-              <a:rPr lang="pt-BR" sz="2000" dirty="0" smtClean="0"/>
+            <a:r>
+              <a:rPr lang="pt-BR" sz="2400" dirty="0"/>
+              <a:t>OLTP (</a:t>
+            </a:r>
+            <a:r>
+              <a:rPr lang="pt-BR" sz="2400" i="1" dirty="0"/>
+              <a:t>Online </a:t>
+            </a:r>
+            <a:r>
+              <a:rPr lang="pt-BR" sz="2400" i="1" dirty="0" err="1"/>
+              <a:t>Transaction</a:t>
+            </a:r>
+            <a:r>
+              <a:rPr lang="pt-BR" sz="2400" i="1" dirty="0"/>
               <a:t> </a:t>
             </a:r>
-          </a:p>
-          <a:p>
-            <a:pPr algn="just"/>
-            <a:r>
-              <a:rPr lang="pt-BR" sz="2000" dirty="0" smtClean="0"/>
-              <a:t>A </a:t>
-            </a:r>
-            <a:r>
-              <a:rPr lang="pt-BR" sz="2000" dirty="0"/>
-              <a:t>principal função do </a:t>
-            </a:r>
-            <a:r>
-              <a:rPr lang="pt-BR" sz="2000" dirty="0" smtClean="0"/>
-              <a:t>Data Warehouse </a:t>
-            </a:r>
-            <a:r>
-              <a:rPr lang="pt-BR" sz="2000" dirty="0"/>
-              <a:t>é prover a informação mais adequada para o grupo que analisa as informações tomar uma decisão analítica de suporte ao negócio.</a:t>
-            </a:r>
+            <a:r>
+              <a:rPr lang="pt-BR" sz="2400" i="1" dirty="0" err="1"/>
+              <a:t>Processing</a:t>
+            </a:r>
+            <a:r>
+              <a:rPr lang="pt-BR" sz="2400" i="1" dirty="0"/>
+              <a:t>)</a:t>
+            </a:r>
+            <a:endParaRPr lang="pt-BR" sz="2400" dirty="0"/>
+          </a:p>
+          <a:p>
+            <a:r>
+              <a:rPr lang="pt-BR" sz="2400" dirty="0" smtClean="0"/>
+              <a:t>OLAP </a:t>
+            </a:r>
+            <a:r>
+              <a:rPr lang="pt-BR" sz="2400" dirty="0" smtClean="0"/>
+              <a:t>(</a:t>
+            </a:r>
+            <a:r>
+              <a:rPr lang="pt-BR" sz="2400" i="1" dirty="0"/>
+              <a:t>Online </a:t>
+            </a:r>
+            <a:r>
+              <a:rPr lang="pt-BR" sz="2400" i="1" dirty="0" err="1"/>
+              <a:t>Analytical</a:t>
+            </a:r>
+            <a:r>
+              <a:rPr lang="pt-BR" sz="2400" i="1" dirty="0"/>
+              <a:t> </a:t>
+            </a:r>
+            <a:r>
+              <a:rPr lang="pt-BR" sz="2400" i="1" dirty="0" err="1" smtClean="0"/>
+              <a:t>Processing</a:t>
+            </a:r>
+            <a:r>
+              <a:rPr lang="pt-BR" sz="2400" i="1" dirty="0" smtClean="0"/>
+              <a:t>)</a:t>
+            </a:r>
+            <a:endParaRPr lang="pt-BR" sz="2400" dirty="0" smtClean="0"/>
+          </a:p>
+          <a:p>
+            <a:r>
+              <a:rPr lang="pt-BR" sz="2400" i="1" dirty="0" smtClean="0"/>
+              <a:t>Data </a:t>
+            </a:r>
+            <a:r>
+              <a:rPr lang="pt-BR" sz="2400" i="1" dirty="0" smtClean="0"/>
+              <a:t>Mining</a:t>
+            </a:r>
+            <a:r>
+              <a:rPr lang="pt-BR" sz="2400" dirty="0" smtClean="0"/>
+              <a:t> (</a:t>
+            </a:r>
+            <a:r>
+              <a:rPr lang="pt-BR" sz="2400" dirty="0" err="1" smtClean="0"/>
+              <a:t>Mineiração</a:t>
+            </a:r>
+            <a:r>
+              <a:rPr lang="pt-BR" sz="2400" dirty="0" smtClean="0"/>
+              <a:t> de Dados)</a:t>
+            </a:r>
+            <a:endParaRPr lang="pt-BR" sz="2400" dirty="0"/>
           </a:p>
         </p:txBody>
       </p:sp>
@@ -8021,7 +8109,7 @@
     </p:spTree>
     <p:extLst>
       <p:ext uri="{BB962C8B-B14F-4D97-AF65-F5344CB8AC3E}">
-        <p14:creationId xmlns:p14="http://schemas.microsoft.com/office/powerpoint/2010/main" val="1336026203"/>
+        <p14:creationId xmlns:p14="http://schemas.microsoft.com/office/powerpoint/2010/main" val="2580112143"/>
       </p:ext>
     </p:extLst>
   </p:cSld>

</xml_diff>